<commit_message>
UML/CD/visibility: update diagram for python, add sample code
</commit_message>
<xml_diff>
--- a/diagrams/uml/classDiagrams/classes/basicNotation.pptx
+++ b/diagrams/uml/classDiagrams/classes/basicNotation.pptx
@@ -104,6 +104,22 @@
       </a:defRPr>
     </a:lvl9pPr>
   </p:defaultTextStyle>
+  <p:extLst>
+    <p:ext uri="{EFAFB233-063F-42B5-8137-9DF3F51BA10A}">
+      <p15:sldGuideLst xmlns:p15="http://schemas.microsoft.com/office/powerpoint/2012/main">
+        <p15:guide id="1" orient="horz" pos="2160">
+          <p15:clr>
+            <a:srgbClr val="A4A3A4"/>
+          </p15:clr>
+        </p15:guide>
+        <p15:guide id="2" pos="2880">
+          <p15:clr>
+            <a:srgbClr val="A4A3A4"/>
+          </p15:clr>
+        </p15:guide>
+      </p15:sldGuideLst>
+    </p:ext>
+  </p:extLst>
 </p:presentation>
 </file>
 
@@ -288,7 +304,7 @@
           <a:p>
             <a:fld id="{A0F86979-30DA-49EE-A740-32EBA6D2B7DE}" type="datetimeFigureOut">
               <a:rPr lang="en-SG" smtClean="0"/>
-              <a:t>2/6/2017</a:t>
+              <a:t>29/6/2020</a:t>
             </a:fld>
             <a:endParaRPr lang="en-SG"/>
           </a:p>
@@ -458,7 +474,7 @@
           <a:p>
             <a:fld id="{A0F86979-30DA-49EE-A740-32EBA6D2B7DE}" type="datetimeFigureOut">
               <a:rPr lang="en-SG" smtClean="0"/>
-              <a:t>2/6/2017</a:t>
+              <a:t>29/6/2020</a:t>
             </a:fld>
             <a:endParaRPr lang="en-SG"/>
           </a:p>
@@ -638,7 +654,7 @@
           <a:p>
             <a:fld id="{A0F86979-30DA-49EE-A740-32EBA6D2B7DE}" type="datetimeFigureOut">
               <a:rPr lang="en-SG" smtClean="0"/>
-              <a:t>2/6/2017</a:t>
+              <a:t>29/6/2020</a:t>
             </a:fld>
             <a:endParaRPr lang="en-SG"/>
           </a:p>
@@ -808,7 +824,7 @@
           <a:p>
             <a:fld id="{A0F86979-30DA-49EE-A740-32EBA6D2B7DE}" type="datetimeFigureOut">
               <a:rPr lang="en-SG" smtClean="0"/>
-              <a:t>2/6/2017</a:t>
+              <a:t>29/6/2020</a:t>
             </a:fld>
             <a:endParaRPr lang="en-SG"/>
           </a:p>
@@ -1054,7 +1070,7 @@
           <a:p>
             <a:fld id="{A0F86979-30DA-49EE-A740-32EBA6D2B7DE}" type="datetimeFigureOut">
               <a:rPr lang="en-SG" smtClean="0"/>
-              <a:t>2/6/2017</a:t>
+              <a:t>29/6/2020</a:t>
             </a:fld>
             <a:endParaRPr lang="en-SG"/>
           </a:p>
@@ -1342,7 +1358,7 @@
           <a:p>
             <a:fld id="{A0F86979-30DA-49EE-A740-32EBA6D2B7DE}" type="datetimeFigureOut">
               <a:rPr lang="en-SG" smtClean="0"/>
-              <a:t>2/6/2017</a:t>
+              <a:t>29/6/2020</a:t>
             </a:fld>
             <a:endParaRPr lang="en-SG"/>
           </a:p>
@@ -1764,7 +1780,7 @@
           <a:p>
             <a:fld id="{A0F86979-30DA-49EE-A740-32EBA6D2B7DE}" type="datetimeFigureOut">
               <a:rPr lang="en-SG" smtClean="0"/>
-              <a:t>2/6/2017</a:t>
+              <a:t>29/6/2020</a:t>
             </a:fld>
             <a:endParaRPr lang="en-SG"/>
           </a:p>
@@ -1882,7 +1898,7 @@
           <a:p>
             <a:fld id="{A0F86979-30DA-49EE-A740-32EBA6D2B7DE}" type="datetimeFigureOut">
               <a:rPr lang="en-SG" smtClean="0"/>
-              <a:t>2/6/2017</a:t>
+              <a:t>29/6/2020</a:t>
             </a:fld>
             <a:endParaRPr lang="en-SG"/>
           </a:p>
@@ -1977,7 +1993,7 @@
           <a:p>
             <a:fld id="{A0F86979-30DA-49EE-A740-32EBA6D2B7DE}" type="datetimeFigureOut">
               <a:rPr lang="en-SG" smtClean="0"/>
-              <a:t>2/6/2017</a:t>
+              <a:t>29/6/2020</a:t>
             </a:fld>
             <a:endParaRPr lang="en-SG"/>
           </a:p>
@@ -2254,7 +2270,7 @@
           <a:p>
             <a:fld id="{A0F86979-30DA-49EE-A740-32EBA6D2B7DE}" type="datetimeFigureOut">
               <a:rPr lang="en-SG" smtClean="0"/>
-              <a:t>2/6/2017</a:t>
+              <a:t>29/6/2020</a:t>
             </a:fld>
             <a:endParaRPr lang="en-SG"/>
           </a:p>
@@ -2507,7 +2523,7 @@
           <a:p>
             <a:fld id="{A0F86979-30DA-49EE-A740-32EBA6D2B7DE}" type="datetimeFigureOut">
               <a:rPr lang="en-SG" smtClean="0"/>
-              <a:t>2/6/2017</a:t>
+              <a:t>29/6/2020</a:t>
             </a:fld>
             <a:endParaRPr lang="en-SG"/>
           </a:p>
@@ -2720,7 +2736,7 @@
           <a:p>
             <a:fld id="{A0F86979-30DA-49EE-A740-32EBA6D2B7DE}" type="datetimeFigureOut">
               <a:rPr lang="en-SG" smtClean="0"/>
-              <a:t>2/6/2017</a:t>
+              <a:t>29/6/2020</a:t>
             </a:fld>
             <a:endParaRPr lang="en-SG"/>
           </a:p>
@@ -3224,7 +3240,25 @@
                 </a:solidFill>
                 <a:latin typeface="Calibri" pitchFamily="34" charset="0"/>
               </a:rPr>
-              <a:t>visibility name = default-value</a:t>
+              <a:t>visibility </a:t>
+            </a:r>
+            <a:r>
+              <a:rPr lang="en-US" sz="1600" kern="0" dirty="0" smtClean="0">
+                <a:solidFill>
+                  <a:sysClr val="windowText" lastClr="000000"/>
+                </a:solidFill>
+                <a:latin typeface="Calibri" pitchFamily="34" charset="0"/>
+              </a:rPr>
+              <a:t>name: type </a:t>
+            </a:r>
+            <a:r>
+              <a:rPr lang="en-US" sz="1600" kern="0" dirty="0" smtClean="0">
+                <a:solidFill>
+                  <a:sysClr val="windowText" lastClr="000000"/>
+                </a:solidFill>
+                <a:latin typeface="Calibri" pitchFamily="34" charset="0"/>
+              </a:rPr>
+              <a:t>= default-value</a:t>
             </a:r>
           </a:p>
           <a:p>

</xml_diff>